<commit_message>
Added notes + more slides.
</commit_message>
<xml_diff>
--- a/jms-basics-day-two.pptx
+++ b/jms-basics-day-two.pptx
@@ -6,10 +6,16 @@
   </p:sldMasterIdLst>
   <p:sldIdLst>
     <p:sldId id="256" r:id="rId2"/>
-    <p:sldId id="257" r:id="rId3"/>
-    <p:sldId id="258" r:id="rId4"/>
-    <p:sldId id="260" r:id="rId5"/>
-    <p:sldId id="259" r:id="rId6"/>
+    <p:sldId id="264" r:id="rId3"/>
+    <p:sldId id="265" r:id="rId4"/>
+    <p:sldId id="266" r:id="rId5"/>
+    <p:sldId id="257" r:id="rId6"/>
+    <p:sldId id="258" r:id="rId7"/>
+    <p:sldId id="260" r:id="rId8"/>
+    <p:sldId id="259" r:id="rId9"/>
+    <p:sldId id="261" r:id="rId10"/>
+    <p:sldId id="262" r:id="rId11"/>
+    <p:sldId id="263" r:id="rId12"/>
   </p:sldIdLst>
   <p:sldSz cx="12192000" cy="6858000"/>
   <p:notesSz cx="6858000" cy="9144000"/>
@@ -108,6 +114,11 @@
       </a:defRPr>
     </a:lvl9pPr>
   </p:defaultTextStyle>
+  <p:extLst>
+    <p:ext uri="{EFAFB233-063F-42B5-8137-9DF3F51BA10A}">
+      <p15:sldGuideLst xmlns:p15="http://schemas.microsoft.com/office/powerpoint/2012/main"/>
+    </p:ext>
+  </p:extLst>
 </p:presentation>
 </file>
 
@@ -297,7 +308,7 @@
           <a:p>
             <a:fld id="{4AAD347D-5ACD-4C99-B74B-A9C85AD731AF}" type="datetimeFigureOut">
               <a:rPr lang="en-US" dirty="0"/>
-              <a:t>10/27/2017</a:t>
+              <a:t>11/18/2017</a:t>
             </a:fld>
             <a:endParaRPr lang="en-US" dirty="0"/>
           </a:p>
@@ -567,7 +578,7 @@
           <a:p>
             <a:fld id="{4509A250-FF31-4206-8172-F9D3106AACB1}" type="datetimeFigureOut">
               <a:rPr lang="en-US" dirty="0"/>
-              <a:t>10/27/2017</a:t>
+              <a:t>11/18/2017</a:t>
             </a:fld>
             <a:endParaRPr lang="en-US" dirty="0"/>
           </a:p>
@@ -756,7 +767,7 @@
           <a:p>
             <a:fld id="{4509A250-FF31-4206-8172-F9D3106AACB1}" type="datetimeFigureOut">
               <a:rPr lang="en-US" dirty="0"/>
-              <a:t>10/27/2017</a:t>
+              <a:t>11/18/2017</a:t>
             </a:fld>
             <a:endParaRPr lang="en-US" dirty="0"/>
           </a:p>
@@ -1024,7 +1035,7 @@
           <a:p>
             <a:fld id="{4509A250-FF31-4206-8172-F9D3106AACB1}" type="datetimeFigureOut">
               <a:rPr lang="en-US" dirty="0"/>
-              <a:t>10/27/2017</a:t>
+              <a:t>11/18/2017</a:t>
             </a:fld>
             <a:endParaRPr lang="en-US" dirty="0"/>
           </a:p>
@@ -1360,7 +1371,7 @@
           <a:p>
             <a:fld id="{4509A250-FF31-4206-8172-F9D3106AACB1}" type="datetimeFigureOut">
               <a:rPr lang="en-US" dirty="0"/>
-              <a:t>10/27/2017</a:t>
+              <a:t>11/18/2017</a:t>
             </a:fld>
             <a:endParaRPr lang="en-US" dirty="0"/>
           </a:p>
@@ -1978,7 +1989,7 @@
           <a:p>
             <a:fld id="{4509A250-FF31-4206-8172-F9D3106AACB1}" type="datetimeFigureOut">
               <a:rPr lang="en-US" dirty="0"/>
-              <a:t>10/27/2017</a:t>
+              <a:t>11/18/2017</a:t>
             </a:fld>
             <a:endParaRPr lang="en-US" dirty="0"/>
           </a:p>
@@ -2833,7 +2844,7 @@
           <a:p>
             <a:fld id="{4509A250-FF31-4206-8172-F9D3106AACB1}" type="datetimeFigureOut">
               <a:rPr lang="en-US" dirty="0"/>
-              <a:t>10/27/2017</a:t>
+              <a:t>11/18/2017</a:t>
             </a:fld>
             <a:endParaRPr lang="en-US" dirty="0"/>
           </a:p>
@@ -2998,7 +3009,7 @@
           <a:p>
             <a:fld id="{4509A250-FF31-4206-8172-F9D3106AACB1}" type="datetimeFigureOut">
               <a:rPr lang="en-US" dirty="0"/>
-              <a:t>10/27/2017</a:t>
+              <a:t>11/18/2017</a:t>
             </a:fld>
             <a:endParaRPr lang="en-US" dirty="0"/>
           </a:p>
@@ -3173,7 +3184,7 @@
           <a:p>
             <a:fld id="{4509A250-FF31-4206-8172-F9D3106AACB1}" type="datetimeFigureOut">
               <a:rPr lang="en-US" dirty="0"/>
-              <a:t>10/27/2017</a:t>
+              <a:t>11/18/2017</a:t>
             </a:fld>
             <a:endParaRPr lang="en-US" dirty="0"/>
           </a:p>
@@ -3338,7 +3349,7 @@
           <a:p>
             <a:fld id="{4509A250-FF31-4206-8172-F9D3106AACB1}" type="datetimeFigureOut">
               <a:rPr lang="en-US" dirty="0"/>
-              <a:t>10/27/2017</a:t>
+              <a:t>11/18/2017</a:t>
             </a:fld>
             <a:endParaRPr lang="en-US" dirty="0"/>
           </a:p>
@@ -3580,7 +3591,7 @@
           <a:p>
             <a:fld id="{9796027F-7875-4030-9381-8BD8C4F21935}" type="datetimeFigureOut">
               <a:rPr lang="en-US" dirty="0"/>
-              <a:t>10/27/2017</a:t>
+              <a:t>11/18/2017</a:t>
             </a:fld>
             <a:endParaRPr lang="en-US" dirty="0"/>
           </a:p>
@@ -3867,7 +3878,7 @@
           <a:p>
             <a:fld id="{9796027F-7875-4030-9381-8BD8C4F21935}" type="datetimeFigureOut">
               <a:rPr lang="en-US" dirty="0"/>
-              <a:t>10/27/2017</a:t>
+              <a:t>11/18/2017</a:t>
             </a:fld>
             <a:endParaRPr lang="en-US" dirty="0"/>
           </a:p>
@@ -4306,7 +4317,7 @@
           <a:p>
             <a:fld id="{9796027F-7875-4030-9381-8BD8C4F21935}" type="datetimeFigureOut">
               <a:rPr lang="en-US" dirty="0"/>
-              <a:t>10/27/2017</a:t>
+              <a:t>11/18/2017</a:t>
             </a:fld>
             <a:endParaRPr lang="en-US" dirty="0"/>
           </a:p>
@@ -4419,7 +4430,7 @@
           <a:p>
             <a:fld id="{4509A250-FF31-4206-8172-F9D3106AACB1}" type="datetimeFigureOut">
               <a:rPr lang="en-US" dirty="0"/>
-              <a:t>10/27/2017</a:t>
+              <a:t>11/18/2017</a:t>
             </a:fld>
             <a:endParaRPr lang="en-US" dirty="0"/>
           </a:p>
@@ -4509,7 +4520,7 @@
           <a:p>
             <a:fld id="{4509A250-FF31-4206-8172-F9D3106AACB1}" type="datetimeFigureOut">
               <a:rPr lang="en-US" dirty="0"/>
-              <a:t>10/27/2017</a:t>
+              <a:t>11/18/2017</a:t>
             </a:fld>
             <a:endParaRPr lang="en-US" dirty="0"/>
           </a:p>
@@ -4783,7 +4794,7 @@
           <a:p>
             <a:fld id="{4509A250-FF31-4206-8172-F9D3106AACB1}" type="datetimeFigureOut">
               <a:rPr lang="en-US" dirty="0"/>
-              <a:t>10/27/2017</a:t>
+              <a:t>11/18/2017</a:t>
             </a:fld>
             <a:endParaRPr lang="en-US" dirty="0"/>
           </a:p>
@@ -5053,7 +5064,7 @@
           <a:p>
             <a:fld id="{4509A250-FF31-4206-8172-F9D3106AACB1}" type="datetimeFigureOut">
               <a:rPr lang="en-US" dirty="0"/>
-              <a:t>10/27/2017</a:t>
+              <a:t>11/18/2017</a:t>
             </a:fld>
             <a:endParaRPr lang="en-US" dirty="0"/>
           </a:p>
@@ -5477,7 +5488,7 @@
           <a:p>
             <a:fld id="{4AAD347D-5ACD-4C99-B74B-A9C85AD731AF}" type="datetimeFigureOut">
               <a:rPr lang="en-US" dirty="0"/>
-              <a:t>10/27/2017</a:t>
+              <a:t>11/18/2017</a:t>
             </a:fld>
             <a:endParaRPr lang="en-US" dirty="0"/>
           </a:p>
@@ -6040,16 +6051,20 @@
           <a:lstStyle/>
           <a:p>
             <a:r>
+              <a:rPr lang="en-US" dirty="0" err="1" smtClean="0"/>
+              <a:t>DEMOnstration</a:t>
+            </a:r>
+            <a:r>
               <a:rPr lang="en-US" dirty="0" smtClean="0"/>
-              <a:t>Basics and usage in </a:t>
+              <a:t> </a:t>
             </a:r>
             <a:r>
               <a:rPr lang="en-US" dirty="0" err="1" smtClean="0"/>
-              <a:t>sirma</a:t>
+              <a:t>jms</a:t>
             </a:r>
             <a:r>
               <a:rPr lang="en-US" dirty="0" smtClean="0"/>
-              <a:t> enterprise platform</a:t>
+              <a:t> 2.0</a:t>
             </a:r>
             <a:endParaRPr lang="bg-BG" dirty="0"/>
           </a:p>
@@ -6059,6 +6074,160 @@
     <p:extLst>
       <p:ext uri="{BB962C8B-B14F-4D97-AF65-F5344CB8AC3E}">
         <p14:creationId xmlns:p14="http://schemas.microsoft.com/office/powerpoint/2010/main" val="1603981960"/>
+      </p:ext>
+    </p:extLst>
+  </p:cSld>
+  <p:clrMapOvr>
+    <a:masterClrMapping/>
+  </p:clrMapOvr>
+</p:sld>
+</file>
+
+<file path=ppt/slides/slide10.xml><?xml version="1.0" encoding="utf-8"?>
+<p:sld xmlns:a="http://schemas.openxmlformats.org/drawingml/2006/main" xmlns:r="http://schemas.openxmlformats.org/officeDocument/2006/relationships" xmlns:p="http://schemas.openxmlformats.org/presentationml/2006/main">
+  <p:cSld>
+    <p:spTree>
+      <p:nvGrpSpPr>
+        <p:cNvPr id="1" name=""/>
+        <p:cNvGrpSpPr/>
+        <p:nvPr/>
+      </p:nvGrpSpPr>
+      <p:grpSpPr>
+        <a:xfrm>
+          <a:off x="0" y="0"/>
+          <a:ext cx="0" cy="0"/>
+          <a:chOff x="0" y="0"/>
+          <a:chExt cx="0" cy="0"/>
+        </a:xfrm>
+      </p:grpSpPr>
+      <p:sp>
+        <p:nvSpPr>
+          <p:cNvPr id="2" name="Title 1"/>
+          <p:cNvSpPr>
+            <a:spLocks noGrp="1"/>
+          </p:cNvSpPr>
+          <p:nvPr>
+            <p:ph type="title"/>
+          </p:nvPr>
+        </p:nvSpPr>
+        <p:spPr/>
+        <p:txBody>
+          <a:bodyPr/>
+          <a:lstStyle/>
+          <a:p>
+            <a:r>
+              <a:rPr lang="en-US" b="1" dirty="0"/>
+              <a:t>JMS Message Consumers</a:t>
+            </a:r>
+            <a:br>
+              <a:rPr lang="en-US" b="1" dirty="0"/>
+            </a:br>
+            <a:endParaRPr lang="bg-BG" dirty="0"/>
+          </a:p>
+        </p:txBody>
+      </p:sp>
+      <p:sp>
+        <p:nvSpPr>
+          <p:cNvPr id="3" name="Content Placeholder 2"/>
+          <p:cNvSpPr>
+            <a:spLocks noGrp="1"/>
+          </p:cNvSpPr>
+          <p:nvPr>
+            <p:ph idx="1"/>
+          </p:nvPr>
+        </p:nvSpPr>
+        <p:spPr/>
+        <p:txBody>
+          <a:bodyPr/>
+          <a:lstStyle/>
+          <a:p>
+            <a:endParaRPr lang="bg-BG"/>
+          </a:p>
+        </p:txBody>
+      </p:sp>
+    </p:spTree>
+    <p:extLst>
+      <p:ext uri="{BB962C8B-B14F-4D97-AF65-F5344CB8AC3E}">
+        <p14:creationId xmlns:p14="http://schemas.microsoft.com/office/powerpoint/2010/main" val="3172739048"/>
+      </p:ext>
+    </p:extLst>
+  </p:cSld>
+  <p:clrMapOvr>
+    <a:masterClrMapping/>
+  </p:clrMapOvr>
+</p:sld>
+</file>
+
+<file path=ppt/slides/slide11.xml><?xml version="1.0" encoding="utf-8"?>
+<p:sld xmlns:a="http://schemas.openxmlformats.org/drawingml/2006/main" xmlns:r="http://schemas.openxmlformats.org/officeDocument/2006/relationships" xmlns:p="http://schemas.openxmlformats.org/presentationml/2006/main">
+  <p:cSld>
+    <p:spTree>
+      <p:nvGrpSpPr>
+        <p:cNvPr id="1" name=""/>
+        <p:cNvGrpSpPr/>
+        <p:nvPr/>
+      </p:nvGrpSpPr>
+      <p:grpSpPr>
+        <a:xfrm>
+          <a:off x="0" y="0"/>
+          <a:ext cx="0" cy="0"/>
+          <a:chOff x="0" y="0"/>
+          <a:chExt cx="0" cy="0"/>
+        </a:xfrm>
+      </p:grpSpPr>
+      <p:sp>
+        <p:nvSpPr>
+          <p:cNvPr id="2" name="Title 1"/>
+          <p:cNvSpPr>
+            <a:spLocks noGrp="1"/>
+          </p:cNvSpPr>
+          <p:nvPr>
+            <p:ph type="title"/>
+          </p:nvPr>
+        </p:nvSpPr>
+        <p:spPr/>
+        <p:txBody>
+          <a:bodyPr/>
+          <a:lstStyle/>
+          <a:p>
+            <a:r>
+              <a:rPr lang="en-US" b="1" dirty="0"/>
+              <a:t>JMS Message Listeners</a:t>
+            </a:r>
+            <a:br>
+              <a:rPr lang="en-US" b="1" dirty="0"/>
+            </a:br>
+            <a:r>
+              <a:rPr lang="en-US" b="1" dirty="0" smtClean="0"/>
+              <a:t>vs Message Driven Beans</a:t>
+            </a:r>
+            <a:endParaRPr lang="bg-BG" dirty="0"/>
+          </a:p>
+        </p:txBody>
+      </p:sp>
+      <p:sp>
+        <p:nvSpPr>
+          <p:cNvPr id="3" name="Content Placeholder 2"/>
+          <p:cNvSpPr>
+            <a:spLocks noGrp="1"/>
+          </p:cNvSpPr>
+          <p:nvPr>
+            <p:ph idx="1"/>
+          </p:nvPr>
+        </p:nvSpPr>
+        <p:spPr/>
+        <p:txBody>
+          <a:bodyPr/>
+          <a:lstStyle/>
+          <a:p>
+            <a:endParaRPr lang="bg-BG"/>
+          </a:p>
+        </p:txBody>
+      </p:sp>
+    </p:spTree>
+    <p:extLst>
+      <p:ext uri="{BB962C8B-B14F-4D97-AF65-F5344CB8AC3E}">
+        <p14:creationId xmlns:p14="http://schemas.microsoft.com/office/powerpoint/2010/main" val="973036531"/>
       </p:ext>
     </p:extLst>
   </p:cSld>
@@ -6102,7 +6271,7 @@
           <a:p>
             <a:r>
               <a:rPr lang="en-US" dirty="0" smtClean="0"/>
-              <a:t>JMS Basics</a:t>
+              <a:t>Configuring the JMS Provider (1)</a:t>
             </a:r>
             <a:endParaRPr lang="bg-BG" dirty="0"/>
           </a:p>
@@ -6118,72 +6287,118 @@
             <p:ph idx="1"/>
           </p:nvPr>
         </p:nvSpPr>
-        <p:spPr/>
+        <p:spPr>
+          <a:xfrm>
+            <a:off x="1103312" y="2052918"/>
+            <a:ext cx="8946541" cy="4805082"/>
+          </a:xfrm>
+        </p:spPr>
         <p:txBody>
           <a:bodyPr/>
           <a:lstStyle/>
           <a:p>
             <a:r>
               <a:rPr lang="en-US" dirty="0" smtClean="0"/>
-              <a:t>Enables communication that is loosely couple;</a:t>
-            </a:r>
-          </a:p>
-          <a:p>
-            <a:pPr lvl="1"/>
+              <a:t>Add the </a:t>
+            </a:r>
+            <a:r>
+              <a:rPr lang="en-US" dirty="0" err="1" smtClean="0"/>
+              <a:t>activeMQ</a:t>
+            </a:r>
             <a:r>
               <a:rPr lang="en-US" dirty="0" smtClean="0"/>
-              <a:t>The receiver does not have to know anything about the sender;</a:t>
-            </a:r>
-          </a:p>
-          <a:p>
-            <a:pPr lvl="1"/>
+              <a:t> extension; </a:t>
+            </a:r>
+          </a:p>
+          <a:p>
+            <a:endParaRPr lang="en-US" dirty="0"/>
+          </a:p>
+          <a:p>
+            <a:endParaRPr lang="en-US" dirty="0" smtClean="0"/>
+          </a:p>
+          <a:p>
+            <a:endParaRPr lang="en-US" dirty="0"/>
+          </a:p>
+          <a:p>
             <a:r>
               <a:rPr lang="en-US" dirty="0" smtClean="0"/>
-              <a:t>The message format has to be known to both.</a:t>
-            </a:r>
-          </a:p>
-          <a:p>
-            <a:pPr lvl="1"/>
-            <a:endParaRPr lang="en-US" dirty="0"/>
-          </a:p>
-          <a:p>
-            <a:pPr marL="400050"/>
+              <a:t>Add the </a:t>
+            </a:r>
+            <a:r>
+              <a:rPr lang="en-US" dirty="0" err="1" smtClean="0"/>
+              <a:t>activeMQ</a:t>
+            </a:r>
             <a:r>
               <a:rPr lang="en-US" dirty="0" smtClean="0"/>
-              <a:t>JMS communication is also reliable;</a:t>
-            </a:r>
-          </a:p>
-          <a:p>
-            <a:pPr marL="800100" lvl="1"/>
-            <a:r>
-              <a:rPr lang="en-US" dirty="0" smtClean="0"/>
-              <a:t>The receiver and the sender don’t have to online at the same time;</a:t>
-            </a:r>
-          </a:p>
-          <a:p>
-            <a:pPr marL="800100" lvl="1"/>
-            <a:r>
-              <a:rPr lang="en-US" dirty="0"/>
-              <a:t>The JMS API can ensure that a message is delivered once and only once</a:t>
-            </a:r>
+              <a:t> subsystem;</a:t>
+            </a:r>
+          </a:p>
+          <a:p>
+            <a:pPr marL="0" indent="0">
+              <a:buNone/>
+            </a:pPr>
             <a:endParaRPr lang="en-US" dirty="0" smtClean="0"/>
           </a:p>
           <a:p>
-            <a:pPr marL="800100" lvl="1"/>
-            <a:r>
-              <a:rPr lang="en-US" dirty="0" smtClean="0"/>
-              <a:t>If the message is not consumed without error it retries.</a:t>
-            </a:r>
-          </a:p>
-          <a:p>
-            <a:endParaRPr lang="en-US" dirty="0" smtClean="0"/>
-          </a:p>
-        </p:txBody>
-      </p:sp>
+            <a:pPr marL="0" indent="0">
+              <a:buNone/>
+            </a:pPr>
+            <a:endParaRPr lang="en-US" dirty="0"/>
+          </a:p>
+        </p:txBody>
+      </p:sp>
+      <p:pic>
+        <p:nvPicPr>
+          <p:cNvPr id="4" name="Picture 3"/>
+          <p:cNvPicPr>
+            <a:picLocks noChangeAspect="1"/>
+          </p:cNvPicPr>
+          <p:nvPr/>
+        </p:nvPicPr>
+        <p:blipFill>
+          <a:blip r:embed="rId2"/>
+          <a:stretch>
+            <a:fillRect/>
+          </a:stretch>
+        </p:blipFill>
+        <p:spPr>
+          <a:xfrm>
+            <a:off x="1223889" y="2642607"/>
+            <a:ext cx="10269415" cy="969291"/>
+          </a:xfrm>
+          <a:prstGeom prst="rect">
+            <a:avLst/>
+          </a:prstGeom>
+        </p:spPr>
+      </p:pic>
+      <p:pic>
+        <p:nvPicPr>
+          <p:cNvPr id="6" name="Picture 5"/>
+          <p:cNvPicPr>
+            <a:picLocks noChangeAspect="1"/>
+          </p:cNvPicPr>
+          <p:nvPr/>
+        </p:nvPicPr>
+        <p:blipFill>
+          <a:blip r:embed="rId3"/>
+          <a:stretch>
+            <a:fillRect/>
+          </a:stretch>
+        </p:blipFill>
+        <p:spPr>
+          <a:xfrm>
+            <a:off x="1223889" y="4401257"/>
+            <a:ext cx="10269415" cy="1530135"/>
+          </a:xfrm>
+          <a:prstGeom prst="rect">
+            <a:avLst/>
+          </a:prstGeom>
+        </p:spPr>
+      </p:pic>
     </p:spTree>
     <p:extLst>
       <p:ext uri="{BB962C8B-B14F-4D97-AF65-F5344CB8AC3E}">
-        <p14:creationId xmlns:p14="http://schemas.microsoft.com/office/powerpoint/2010/main" val="3682124107"/>
+        <p14:creationId xmlns:p14="http://schemas.microsoft.com/office/powerpoint/2010/main" val="2734272038"/>
       </p:ext>
     </p:extLst>
   </p:cSld>
@@ -6226,12 +6441,13 @@
           <a:lstStyle/>
           <a:p>
             <a:r>
-              <a:rPr lang="en-US" b="1" dirty="0"/>
-              <a:t>Basic JMS API Concepts</a:t>
-            </a:r>
-            <a:br>
-              <a:rPr lang="en-US" b="1" dirty="0"/>
-            </a:br>
+              <a:rPr lang="en-US" dirty="0"/>
+              <a:t>Configuring the JMS Provider </a:t>
+            </a:r>
+            <a:r>
+              <a:rPr lang="en-US" dirty="0" smtClean="0"/>
+              <a:t>(2)</a:t>
+            </a:r>
             <a:endParaRPr lang="bg-BG" dirty="0"/>
           </a:p>
         </p:txBody>
@@ -6252,66 +6468,100 @@
           <a:lstStyle/>
           <a:p>
             <a:r>
-              <a:rPr lang="en-US" b="1" dirty="0"/>
-              <a:t>JMS </a:t>
-            </a:r>
-            <a:r>
-              <a:rPr lang="en-US" b="1" dirty="0" smtClean="0"/>
-              <a:t>clients</a:t>
-            </a:r>
-            <a:r>
-              <a:rPr lang="en-US" dirty="0"/>
-              <a:t>:</a:t>
-            </a:r>
-            <a:r>
               <a:rPr lang="en-US" dirty="0" smtClean="0"/>
-              <a:t> components that </a:t>
-            </a:r>
-            <a:r>
-              <a:rPr lang="en-US" dirty="0"/>
-              <a:t>produce and consume </a:t>
-            </a:r>
+              <a:t>Connection Factory;</a:t>
+            </a:r>
+          </a:p>
+          <a:p>
+            <a:pPr marL="0" indent="0">
+              <a:buNone/>
+            </a:pPr>
+            <a:endParaRPr lang="en-US" dirty="0"/>
+          </a:p>
+          <a:p>
+            <a:pPr marL="0" indent="0">
+              <a:buNone/>
+            </a:pPr>
+            <a:endParaRPr lang="en-US" dirty="0" smtClean="0"/>
+          </a:p>
+          <a:p>
+            <a:pPr marL="0" indent="0">
+              <a:buNone/>
+            </a:pPr>
+            <a:endParaRPr lang="en-US" dirty="0"/>
+          </a:p>
+          <a:p>
+            <a:pPr marL="0" indent="0">
+              <a:buNone/>
+            </a:pPr>
+            <a:endParaRPr lang="en-US" dirty="0" smtClean="0"/>
+          </a:p>
+          <a:p>
             <a:r>
               <a:rPr lang="en-US" dirty="0" smtClean="0"/>
-              <a:t>messages;</a:t>
-            </a:r>
-          </a:p>
-          <a:p>
-            <a:r>
-              <a:rPr lang="en-US" b="1" dirty="0"/>
-              <a:t>Messages</a:t>
-            </a:r>
-            <a:r>
-              <a:rPr lang="en-US" dirty="0"/>
-              <a:t> are the objects that communicate information between JMS </a:t>
-            </a:r>
-            <a:r>
-              <a:rPr lang="en-US" dirty="0" smtClean="0"/>
-              <a:t>clients</a:t>
-            </a:r>
-            <a:r>
-              <a:rPr lang="en-US" dirty="0"/>
-              <a:t>;</a:t>
-            </a:r>
-            <a:endParaRPr lang="en-US" dirty="0" smtClean="0"/>
-          </a:p>
-          <a:p>
-            <a:r>
-              <a:rPr lang="en-US" b="1" dirty="0" smtClean="0"/>
-              <a:t>Topic/Queue: </a:t>
-            </a:r>
-            <a:r>
-              <a:rPr lang="en-US" dirty="0" smtClean="0"/>
-              <a:t>the to main mechanisms, more details later;</a:t>
-            </a:r>
+              <a:t>HTTP acceptor and connector</a:t>
+            </a:r>
+          </a:p>
+          <a:p>
+            <a:pPr marL="0" indent="0">
+              <a:buNone/>
+            </a:pPr>
             <a:endParaRPr lang="bg-BG" dirty="0"/>
           </a:p>
         </p:txBody>
       </p:sp>
+      <p:pic>
+        <p:nvPicPr>
+          <p:cNvPr id="4" name="Picture 3"/>
+          <p:cNvPicPr>
+            <a:picLocks noChangeAspect="1"/>
+          </p:cNvPicPr>
+          <p:nvPr/>
+        </p:nvPicPr>
+        <p:blipFill>
+          <a:blip r:embed="rId2"/>
+          <a:stretch>
+            <a:fillRect/>
+          </a:stretch>
+        </p:blipFill>
+        <p:spPr>
+          <a:xfrm>
+            <a:off x="646111" y="2703556"/>
+            <a:ext cx="11085342" cy="1242448"/>
+          </a:xfrm>
+          <a:prstGeom prst="rect">
+            <a:avLst/>
+          </a:prstGeom>
+        </p:spPr>
+      </p:pic>
+      <p:pic>
+        <p:nvPicPr>
+          <p:cNvPr id="5" name="Picture 4"/>
+          <p:cNvPicPr>
+            <a:picLocks noChangeAspect="1"/>
+          </p:cNvPicPr>
+          <p:nvPr/>
+        </p:nvPicPr>
+        <p:blipFill>
+          <a:blip r:embed="rId3"/>
+          <a:stretch>
+            <a:fillRect/>
+          </a:stretch>
+        </p:blipFill>
+        <p:spPr>
+          <a:xfrm>
+            <a:off x="659176" y="4596642"/>
+            <a:ext cx="11072277" cy="2179659"/>
+          </a:xfrm>
+          <a:prstGeom prst="rect">
+            <a:avLst/>
+          </a:prstGeom>
+        </p:spPr>
+      </p:pic>
     </p:spTree>
     <p:extLst>
       <p:ext uri="{BB962C8B-B14F-4D97-AF65-F5344CB8AC3E}">
-        <p14:creationId xmlns:p14="http://schemas.microsoft.com/office/powerpoint/2010/main" val="559155060"/>
+        <p14:creationId xmlns:p14="http://schemas.microsoft.com/office/powerpoint/2010/main" val="3599545899"/>
       </p:ext>
     </p:extLst>
   </p:cSld>
@@ -6353,23 +6603,199 @@
           <a:bodyPr/>
           <a:lstStyle/>
           <a:p>
+            <a:endParaRPr lang="bg-BG"/>
+          </a:p>
+        </p:txBody>
+      </p:sp>
+      <p:sp>
+        <p:nvSpPr>
+          <p:cNvPr id="3" name="Content Placeholder 2"/>
+          <p:cNvSpPr>
+            <a:spLocks noGrp="1"/>
+          </p:cNvSpPr>
+          <p:nvPr>
+            <p:ph idx="1"/>
+          </p:nvPr>
+        </p:nvSpPr>
+        <p:spPr>
+          <a:xfrm>
+            <a:off x="1104293" y="2024782"/>
+            <a:ext cx="8946541" cy="4195481"/>
+          </a:xfrm>
+        </p:spPr>
+        <p:txBody>
+          <a:bodyPr/>
+          <a:lstStyle/>
+          <a:p>
             <a:r>
               <a:rPr lang="en-US" dirty="0" smtClean="0"/>
-              <a:t>JMS Queue</a:t>
-            </a:r>
+              <a:t>Queue and Topic Definitions;</a:t>
+            </a:r>
+          </a:p>
+          <a:p>
+            <a:endParaRPr lang="en-US" dirty="0"/>
+          </a:p>
+          <a:p>
+            <a:endParaRPr lang="en-US" dirty="0" smtClean="0"/>
+          </a:p>
+          <a:p>
+            <a:r>
+              <a:rPr lang="en-US" dirty="0" smtClean="0"/>
+              <a:t>Note the JNDI names.</a:t>
+            </a:r>
+          </a:p>
+          <a:p>
+            <a:pPr lvl="1"/>
+            <a:r>
+              <a:rPr lang="en-US" dirty="0" smtClean="0"/>
+              <a:t>Queue: </a:t>
+            </a:r>
+            <a:r>
+              <a:rPr lang="en-US" dirty="0" err="1" smtClean="0"/>
+              <a:t>java:jboss</a:t>
+            </a:r>
+            <a:r>
+              <a:rPr lang="en-US" dirty="0" smtClean="0"/>
+              <a:t>/exported/</a:t>
+            </a:r>
+            <a:r>
+              <a:rPr lang="en-US" dirty="0" err="1" smtClean="0"/>
+              <a:t>jms</a:t>
+            </a:r>
+            <a:r>
+              <a:rPr lang="en-US" dirty="0" smtClean="0"/>
+              <a:t>/queue/test</a:t>
+            </a:r>
+          </a:p>
+          <a:p>
+            <a:pPr lvl="1"/>
+            <a:r>
+              <a:rPr lang="en-US" dirty="0" smtClean="0"/>
+              <a:t>Topic: </a:t>
+            </a:r>
+            <a:r>
+              <a:rPr lang="en-US" dirty="0" err="1" smtClean="0"/>
+              <a:t>java:jboss</a:t>
+            </a:r>
+            <a:r>
+              <a:rPr lang="en-US" dirty="0" smtClean="0"/>
+              <a:t>/exported/</a:t>
+            </a:r>
+            <a:r>
+              <a:rPr lang="en-US" dirty="0" err="1" smtClean="0"/>
+              <a:t>jms</a:t>
+            </a:r>
+            <a:r>
+              <a:rPr lang="en-US" dirty="0" smtClean="0"/>
+              <a:t>/topic/test</a:t>
+            </a:r>
+            <a:endParaRPr lang="en-US" dirty="0"/>
+          </a:p>
+          <a:p>
+            <a:endParaRPr lang="en-US" dirty="0" smtClean="0"/>
+          </a:p>
+          <a:p>
+            <a:pPr marL="0" indent="0">
+              <a:buNone/>
+            </a:pPr>
+            <a:endParaRPr lang="en-US" dirty="0"/>
+          </a:p>
+          <a:p>
+            <a:pPr marL="0" indent="0">
+              <a:buNone/>
+            </a:pPr>
             <a:endParaRPr lang="bg-BG" dirty="0"/>
           </a:p>
         </p:txBody>
       </p:sp>
       <p:pic>
         <p:nvPicPr>
-          <p:cNvPr id="4" name="Content Placeholder 3"/>
+          <p:cNvPr id="4" name="Picture 3"/>
           <p:cNvPicPr>
-            <a:picLocks noGrp="1" noChangeAspect="1"/>
+            <a:picLocks noChangeAspect="1"/>
           </p:cNvPicPr>
-          <p:nvPr>
-            <p:ph idx="1"/>
-          </p:nvPr>
+          <p:nvPr/>
+        </p:nvPicPr>
+        <p:blipFill>
+          <a:blip r:embed="rId2"/>
+          <a:stretch>
+            <a:fillRect/>
+          </a:stretch>
+        </p:blipFill>
+        <p:spPr>
+          <a:xfrm>
+            <a:off x="0" y="2698943"/>
+            <a:ext cx="12192000" cy="531645"/>
+          </a:xfrm>
+          <a:prstGeom prst="rect">
+            <a:avLst/>
+          </a:prstGeom>
+        </p:spPr>
+      </p:pic>
+    </p:spTree>
+    <p:extLst>
+      <p:ext uri="{BB962C8B-B14F-4D97-AF65-F5344CB8AC3E}">
+        <p14:creationId xmlns:p14="http://schemas.microsoft.com/office/powerpoint/2010/main" val="228459890"/>
+      </p:ext>
+    </p:extLst>
+  </p:cSld>
+  <p:clrMapOvr>
+    <a:masterClrMapping/>
+  </p:clrMapOvr>
+</p:sld>
+</file>
+
+<file path=ppt/slides/slide5.xml><?xml version="1.0" encoding="utf-8"?>
+<p:sld xmlns:a="http://schemas.openxmlformats.org/drawingml/2006/main" xmlns:r="http://schemas.openxmlformats.org/officeDocument/2006/relationships" xmlns:p="http://schemas.openxmlformats.org/presentationml/2006/main">
+  <p:cSld>
+    <p:spTree>
+      <p:nvGrpSpPr>
+        <p:cNvPr id="1" name=""/>
+        <p:cNvGrpSpPr/>
+        <p:nvPr/>
+      </p:nvGrpSpPr>
+      <p:grpSpPr>
+        <a:xfrm>
+          <a:off x="0" y="0"/>
+          <a:ext cx="0" cy="0"/>
+          <a:chOff x="0" y="0"/>
+          <a:chExt cx="0" cy="0"/>
+        </a:xfrm>
+      </p:grpSpPr>
+      <p:sp>
+        <p:nvSpPr>
+          <p:cNvPr id="2" name="Title 1"/>
+          <p:cNvSpPr>
+            <a:spLocks noGrp="1"/>
+          </p:cNvSpPr>
+          <p:nvPr>
+            <p:ph type="title"/>
+          </p:nvPr>
+        </p:nvSpPr>
+        <p:spPr/>
+        <p:txBody>
+          <a:bodyPr/>
+          <a:lstStyle/>
+          <a:p>
+            <a:r>
+              <a:rPr lang="en-US" dirty="0" smtClean="0"/>
+              <a:t>JMS </a:t>
+            </a:r>
+            <a:r>
+              <a:rPr lang="en-US" dirty="0" smtClean="0"/>
+              <a:t>API Programming Model</a:t>
+            </a:r>
+            <a:endParaRPr lang="bg-BG" dirty="0"/>
+          </a:p>
+        </p:txBody>
+      </p:sp>
+      <p:pic>
+        <p:nvPicPr>
+          <p:cNvPr id="4" name="Picture 3"/>
+          <p:cNvPicPr>
+            <a:picLocks noChangeAspect="1"/>
+          </p:cNvPicPr>
+          <p:nvPr/>
         </p:nvPicPr>
         <p:blipFill>
           <a:blip r:embed="rId2">
@@ -6385,11 +6811,243 @@
         </p:blipFill>
         <p:spPr>
           <a:xfrm>
-            <a:off x="3183365" y="4077730"/>
-            <a:ext cx="5732250" cy="2347783"/>
+            <a:off x="2838083" y="1853248"/>
+            <a:ext cx="6066766" cy="5001929"/>
           </a:xfrm>
+          <a:prstGeom prst="rect">
+            <a:avLst/>
+          </a:prstGeom>
         </p:spPr>
       </p:pic>
+    </p:spTree>
+    <p:extLst>
+      <p:ext uri="{BB962C8B-B14F-4D97-AF65-F5344CB8AC3E}">
+        <p14:creationId xmlns:p14="http://schemas.microsoft.com/office/powerpoint/2010/main" val="3682124107"/>
+      </p:ext>
+    </p:extLst>
+  </p:cSld>
+  <p:clrMapOvr>
+    <a:masterClrMapping/>
+  </p:clrMapOvr>
+</p:sld>
+</file>
+
+<file path=ppt/slides/slide6.xml><?xml version="1.0" encoding="utf-8"?>
+<p:sld xmlns:a="http://schemas.openxmlformats.org/drawingml/2006/main" xmlns:r="http://schemas.openxmlformats.org/officeDocument/2006/relationships" xmlns:p="http://schemas.openxmlformats.org/presentationml/2006/main">
+  <p:cSld>
+    <p:spTree>
+      <p:nvGrpSpPr>
+        <p:cNvPr id="1" name=""/>
+        <p:cNvGrpSpPr/>
+        <p:nvPr/>
+      </p:nvGrpSpPr>
+      <p:grpSpPr>
+        <a:xfrm>
+          <a:off x="0" y="0"/>
+          <a:ext cx="0" cy="0"/>
+          <a:chOff x="0" y="0"/>
+          <a:chExt cx="0" cy="0"/>
+        </a:xfrm>
+      </p:grpSpPr>
+      <p:sp>
+        <p:nvSpPr>
+          <p:cNvPr id="2" name="Title 1"/>
+          <p:cNvSpPr>
+            <a:spLocks noGrp="1"/>
+          </p:cNvSpPr>
+          <p:nvPr>
+            <p:ph type="title"/>
+          </p:nvPr>
+        </p:nvSpPr>
+        <p:spPr/>
+        <p:txBody>
+          <a:bodyPr/>
+          <a:lstStyle/>
+          <a:p>
+            <a:r>
+              <a:rPr lang="en-US" b="1" dirty="0"/>
+              <a:t>Basic JMS API Concepts</a:t>
+            </a:r>
+            <a:br>
+              <a:rPr lang="en-US" b="1" dirty="0"/>
+            </a:br>
+            <a:endParaRPr lang="bg-BG" dirty="0"/>
+          </a:p>
+        </p:txBody>
+      </p:sp>
+      <p:sp>
+        <p:nvSpPr>
+          <p:cNvPr id="3" name="Content Placeholder 2"/>
+          <p:cNvSpPr>
+            <a:spLocks noGrp="1"/>
+          </p:cNvSpPr>
+          <p:nvPr>
+            <p:ph idx="1"/>
+          </p:nvPr>
+        </p:nvSpPr>
+        <p:spPr/>
+        <p:txBody>
+          <a:bodyPr>
+            <a:normAutofit lnSpcReduction="10000"/>
+          </a:bodyPr>
+          <a:lstStyle/>
+          <a:p>
+            <a:r>
+              <a:rPr lang="en-US" b="1" dirty="0"/>
+              <a:t>connection </a:t>
+            </a:r>
+            <a:r>
+              <a:rPr lang="en-US" b="1" dirty="0" smtClean="0"/>
+              <a:t>factory - </a:t>
+            </a:r>
+            <a:r>
+              <a:rPr lang="en-US" dirty="0"/>
+              <a:t>is the object a client uses to create a connection to a provider. A connection factory encapsulates a set of connection configuration parameters that has been defined by an </a:t>
+            </a:r>
+            <a:r>
+              <a:rPr lang="en-US" dirty="0" smtClean="0"/>
+              <a:t>administrator;</a:t>
+            </a:r>
+          </a:p>
+          <a:p>
+            <a:endParaRPr lang="en-US" dirty="0"/>
+          </a:p>
+          <a:p>
+            <a:r>
+              <a:rPr lang="en-US" dirty="0" smtClean="0"/>
+              <a:t>Can be injected with:</a:t>
+            </a:r>
+            <a:endParaRPr lang="en-US" dirty="0"/>
+          </a:p>
+          <a:p>
+            <a:pPr marL="0" indent="0">
+              <a:buNone/>
+            </a:pPr>
+            <a:r>
+              <a:rPr lang="en-US" dirty="0" smtClean="0"/>
+              <a:t/>
+            </a:r>
+            <a:br>
+              <a:rPr lang="en-US" dirty="0" smtClean="0"/>
+            </a:br>
+            <a:r>
+              <a:rPr lang="en-US" dirty="0" smtClean="0"/>
+              <a:t>@Resource(lookup = "</a:t>
+            </a:r>
+            <a:r>
+              <a:rPr lang="en-US" dirty="0" err="1" smtClean="0"/>
+              <a:t>jms</a:t>
+            </a:r>
+            <a:r>
+              <a:rPr lang="en-US" dirty="0" smtClean="0"/>
+              <a:t>/</a:t>
+            </a:r>
+            <a:r>
+              <a:rPr lang="en-US" dirty="0" err="1" smtClean="0"/>
+              <a:t>ConnectionFactory</a:t>
+            </a:r>
+            <a:r>
+              <a:rPr lang="en-US" dirty="0" smtClean="0"/>
+              <a:t>")</a:t>
+            </a:r>
+          </a:p>
+          <a:p>
+            <a:pPr marL="0" indent="0">
+              <a:buNone/>
+            </a:pPr>
+            <a:r>
+              <a:rPr lang="en-US" dirty="0" smtClean="0"/>
+              <a:t>private static </a:t>
+            </a:r>
+            <a:r>
+              <a:rPr lang="en-US" dirty="0" err="1" smtClean="0"/>
+              <a:t>ConnectionFactory</a:t>
+            </a:r>
+            <a:r>
+              <a:rPr lang="en-US" dirty="0" smtClean="0"/>
+              <a:t> </a:t>
+            </a:r>
+            <a:r>
+              <a:rPr lang="en-US" dirty="0" err="1" smtClean="0"/>
+              <a:t>connectionFactory</a:t>
+            </a:r>
+            <a:r>
+              <a:rPr lang="en-US" dirty="0" smtClean="0"/>
+              <a:t>;</a:t>
+            </a:r>
+          </a:p>
+          <a:p>
+            <a:pPr marL="0" indent="0">
+              <a:buNone/>
+            </a:pPr>
+            <a:endParaRPr lang="en-US" dirty="0" smtClean="0"/>
+          </a:p>
+          <a:p>
+            <a:r>
+              <a:rPr lang="en-US" dirty="0" smtClean="0"/>
+              <a:t>Or looked up from JNDI</a:t>
+            </a:r>
+            <a:endParaRPr lang="en-US" dirty="0"/>
+          </a:p>
+        </p:txBody>
+      </p:sp>
+    </p:spTree>
+    <p:extLst>
+      <p:ext uri="{BB962C8B-B14F-4D97-AF65-F5344CB8AC3E}">
+        <p14:creationId xmlns:p14="http://schemas.microsoft.com/office/powerpoint/2010/main" val="559155060"/>
+      </p:ext>
+    </p:extLst>
+  </p:cSld>
+  <p:clrMapOvr>
+    <a:masterClrMapping/>
+  </p:clrMapOvr>
+</p:sld>
+</file>
+
+<file path=ppt/slides/slide7.xml><?xml version="1.0" encoding="utf-8"?>
+<p:sld xmlns:a="http://schemas.openxmlformats.org/drawingml/2006/main" xmlns:r="http://schemas.openxmlformats.org/officeDocument/2006/relationships" xmlns:p="http://schemas.openxmlformats.org/presentationml/2006/main">
+  <p:cSld>
+    <p:spTree>
+      <p:nvGrpSpPr>
+        <p:cNvPr id="1" name=""/>
+        <p:cNvGrpSpPr/>
+        <p:nvPr/>
+      </p:nvGrpSpPr>
+      <p:grpSpPr>
+        <a:xfrm>
+          <a:off x="0" y="0"/>
+          <a:ext cx="0" cy="0"/>
+          <a:chOff x="0" y="0"/>
+          <a:chExt cx="0" cy="0"/>
+        </a:xfrm>
+      </p:grpSpPr>
+      <p:sp>
+        <p:nvSpPr>
+          <p:cNvPr id="2" name="Title 1"/>
+          <p:cNvSpPr>
+            <a:spLocks noGrp="1"/>
+          </p:cNvSpPr>
+          <p:nvPr>
+            <p:ph type="title"/>
+          </p:nvPr>
+        </p:nvSpPr>
+        <p:spPr/>
+        <p:txBody>
+          <a:bodyPr/>
+          <a:lstStyle/>
+          <a:p>
+            <a:r>
+              <a:rPr lang="en-US" dirty="0" smtClean="0"/>
+              <a:t>JMS </a:t>
+            </a:r>
+            <a:r>
+              <a:rPr lang="en-US" dirty="0" smtClean="0"/>
+              <a:t>Session</a:t>
+            </a:r>
+            <a:endParaRPr lang="bg-BG" dirty="0"/>
+          </a:p>
+        </p:txBody>
+      </p:sp>
       <p:sp>
         <p:nvSpPr>
           <p:cNvPr id="11" name="Content Placeholder 2"/>
@@ -6400,8 +7058,8 @@
         </p:nvSpPr>
         <p:spPr>
           <a:xfrm>
-            <a:off x="814989" y="1492745"/>
-            <a:ext cx="10767412" cy="2444941"/>
+            <a:off x="772785" y="1853248"/>
+            <a:ext cx="10767412" cy="4561620"/>
           </a:xfrm>
           <a:prstGeom prst="rect">
             <a:avLst/>
@@ -6640,62 +7298,93 @@
           </a:lstStyle>
           <a:p>
             <a:r>
+              <a:rPr lang="en-US" dirty="0"/>
+              <a:t>A </a:t>
+            </a:r>
+            <a:r>
+              <a:rPr lang="en-US" b="1" dirty="0"/>
+              <a:t>session</a:t>
+            </a:r>
+            <a:r>
+              <a:rPr lang="en-US" dirty="0"/>
+              <a:t> is a single-threaded context for producing and consuming messages. You use sessions to create the </a:t>
+            </a:r>
+            <a:r>
               <a:rPr lang="en-US" dirty="0" smtClean="0"/>
-              <a:t>Point-to-point</a:t>
-            </a:r>
-          </a:p>
-          <a:p>
+              <a:t>following:</a:t>
+            </a:r>
+          </a:p>
+          <a:p>
+            <a:pPr lvl="1"/>
             <a:r>
               <a:rPr lang="en-US" dirty="0"/>
-              <a:t>Only one consumer gets the </a:t>
+              <a:t>Message producers</a:t>
+            </a:r>
+          </a:p>
+          <a:p>
+            <a:pPr lvl="1"/>
+            <a:r>
+              <a:rPr lang="en-US" dirty="0"/>
+              <a:t>Message consumers</a:t>
+            </a:r>
+          </a:p>
+          <a:p>
+            <a:pPr lvl="1"/>
+            <a:r>
+              <a:rPr lang="en-US" dirty="0"/>
+              <a:t>Messages</a:t>
+            </a:r>
+          </a:p>
+          <a:p>
+            <a:pPr lvl="1"/>
+            <a:r>
+              <a:rPr lang="en-US" dirty="0"/>
+              <a:t>Queue browsers</a:t>
+            </a:r>
+          </a:p>
+          <a:p>
+            <a:pPr lvl="1"/>
+            <a:r>
+              <a:rPr lang="en-US" dirty="0"/>
+              <a:t>Temporary queues and </a:t>
             </a:r>
             <a:r>
               <a:rPr lang="en-US" dirty="0" smtClean="0"/>
-              <a:t>message;</a:t>
-            </a:r>
-            <a:endParaRPr lang="en-US" dirty="0"/>
-          </a:p>
-          <a:p>
+              <a:t>topics</a:t>
+            </a:r>
+          </a:p>
+          <a:p>
+            <a:r>
+              <a:rPr lang="en-US" dirty="0" smtClean="0"/>
+              <a:t>To create a transacted session use:</a:t>
+            </a:r>
+          </a:p>
+          <a:p>
+            <a:pPr lvl="1"/>
             <a:r>
               <a:rPr lang="en-US" dirty="0"/>
-              <a:t>Messages have to be delivered in the order </a:t>
-            </a:r>
-            <a:r>
-              <a:rPr lang="en-US" dirty="0" smtClean="0"/>
-              <a:t>sent;</a:t>
-            </a:r>
-            <a:endParaRPr lang="en-US" dirty="0"/>
-          </a:p>
-          <a:p>
+              <a:t>Session </a:t>
+            </a:r>
+            <a:r>
+              <a:rPr lang="en-US" dirty="0" err="1"/>
+              <a:t>session</a:t>
+            </a:r>
             <a:r>
               <a:rPr lang="en-US" dirty="0"/>
-              <a:t>The Queue knows who the consumer or the JMS client is. The destination is </a:t>
-            </a:r>
-            <a:r>
-              <a:rPr lang="en-US" dirty="0" smtClean="0"/>
-              <a:t>known</a:t>
+              <a:t> = </a:t>
+            </a:r>
+            <a:r>
+              <a:rPr lang="en-US" dirty="0" err="1"/>
+              <a:t>connection.createSession</a:t>
             </a:r>
             <a:r>
               <a:rPr lang="en-US" dirty="0"/>
-              <a:t>;</a:t>
-            </a:r>
-            <a:endParaRPr lang="en-US" dirty="0" smtClean="0"/>
-          </a:p>
-          <a:p>
-            <a:r>
-              <a:rPr lang="en-US" dirty="0"/>
-              <a:t>Every message successfully processed is acknowledged by the </a:t>
-            </a:r>
-            <a:r>
-              <a:rPr lang="en-US" dirty="0" smtClean="0"/>
-              <a:t>consumer;</a:t>
-            </a:r>
-            <a:endParaRPr lang="en-US" dirty="0"/>
-          </a:p>
-          <a:p>
-            <a:pPr marL="0" indent="0">
-              <a:buNone/>
-            </a:pPr>
+              <a:t>(true, 0);</a:t>
+            </a:r>
+            <a:endParaRPr lang="en-US" dirty="0"/>
+          </a:p>
+          <a:p>
+            <a:pPr lvl="1"/>
             <a:endParaRPr lang="en-US" dirty="0"/>
           </a:p>
           <a:p>
@@ -6716,7 +7405,7 @@
 </p:sld>
 </file>
 
-<file path=ppt/slides/slide5.xml><?xml version="1.0" encoding="utf-8"?>
+<file path=ppt/slides/slide8.xml><?xml version="1.0" encoding="utf-8"?>
 <p:sld xmlns:a="http://schemas.openxmlformats.org/drawingml/2006/main" xmlns:r="http://schemas.openxmlformats.org/officeDocument/2006/relationships" xmlns:p="http://schemas.openxmlformats.org/presentationml/2006/main">
   <p:cSld>
     <p:spTree>
@@ -6754,44 +7443,12 @@
             </a:r>
             <a:r>
               <a:rPr lang="en-US" dirty="0" smtClean="0"/>
-              <a:t>Topic</a:t>
+              <a:t>Topic/Queue</a:t>
             </a:r>
             <a:endParaRPr lang="bg-BG" dirty="0"/>
           </a:p>
         </p:txBody>
       </p:sp>
-      <p:pic>
-        <p:nvPicPr>
-          <p:cNvPr id="4" name="Content Placeholder 3"/>
-          <p:cNvPicPr>
-            <a:picLocks noGrp="1" noChangeAspect="1"/>
-          </p:cNvPicPr>
-          <p:nvPr>
-            <p:ph idx="1"/>
-          </p:nvPr>
-        </p:nvPicPr>
-        <p:blipFill>
-          <a:blip r:embed="rId2">
-            <a:extLst>
-              <a:ext uri="{28A0092B-C50C-407E-A947-70E740481C1C}">
-                <a14:useLocalDpi xmlns:a14="http://schemas.microsoft.com/office/drawing/2010/main" val="0"/>
-              </a:ext>
-            </a:extLst>
-          </a:blip>
-          <a:stretch>
-            <a:fillRect/>
-          </a:stretch>
-        </p:blipFill>
-        <p:spPr>
-          <a:xfrm>
-            <a:off x="3232062" y="4207152"/>
-            <a:ext cx="4643311" cy="2091357"/>
-          </a:xfrm>
-          <a:prstGeom prst="rect">
-            <a:avLst/>
-          </a:prstGeom>
-        </p:spPr>
-      </p:pic>
       <p:sp>
         <p:nvSpPr>
           <p:cNvPr id="6" name="Content Placeholder 2"/>
@@ -7043,52 +7700,66 @@
           <a:p>
             <a:r>
               <a:rPr lang="en-US" dirty="0"/>
-              <a:t>Publish/subscribe </a:t>
+              <a:t>Queue </a:t>
+            </a:r>
+            <a:r>
+              <a:rPr lang="en-US" dirty="0" err="1"/>
+              <a:t>queue</a:t>
+            </a:r>
+            <a:r>
+              <a:rPr lang="en-US" dirty="0"/>
+              <a:t> = </a:t>
+            </a:r>
+            <a:r>
+              <a:rPr lang="en-US" dirty="0" err="1"/>
+              <a:t>InitialContext.doLookup</a:t>
+            </a:r>
+            <a:r>
+              <a:rPr lang="en-US" dirty="0"/>
+              <a:t>("</a:t>
+            </a:r>
+            <a:r>
+              <a:rPr lang="en-US" dirty="0" err="1"/>
+              <a:t>java:jboss</a:t>
+            </a:r>
+            <a:r>
+              <a:rPr lang="en-US" dirty="0"/>
+              <a:t>/exported/</a:t>
+            </a:r>
+            <a:r>
+              <a:rPr lang="en-US" dirty="0" err="1"/>
+              <a:t>jms</a:t>
+            </a:r>
+            <a:r>
+              <a:rPr lang="en-US" dirty="0"/>
+              <a:t>/queue/test</a:t>
             </a:r>
             <a:r>
               <a:rPr lang="en-US" dirty="0" smtClean="0"/>
-              <a:t>model;</a:t>
-            </a:r>
-            <a:endParaRPr lang="en-US" dirty="0"/>
+              <a:t>");</a:t>
+            </a:r>
           </a:p>
           <a:p>
             <a:r>
               <a:rPr lang="en-US" dirty="0"/>
-              <a:t>Multiple clients subscribe to the </a:t>
-            </a:r>
-            <a:r>
-              <a:rPr lang="en-US" dirty="0" smtClean="0"/>
-              <a:t>message;</a:t>
-            </a:r>
-          </a:p>
-          <a:p>
+              <a:t>@Resource(lookup = "</a:t>
+            </a:r>
+            <a:r>
+              <a:rPr lang="en-US" dirty="0" err="1"/>
+              <a:t>jms</a:t>
+            </a:r>
             <a:r>
               <a:rPr lang="en-US" dirty="0"/>
-              <a:t>H</a:t>
-            </a:r>
-            <a:r>
-              <a:rPr lang="en-US" dirty="0" smtClean="0"/>
-              <a:t>ere </a:t>
+              <a:t>/</a:t>
+            </a:r>
+            <a:r>
+              <a:rPr lang="en-US" dirty="0" err="1"/>
+              <a:t>ConnectionFactory</a:t>
             </a:r>
             <a:r>
               <a:rPr lang="en-US" dirty="0"/>
-              <a:t>is no guarantee messages have to be delivered in the order </a:t>
-            </a:r>
-            <a:r>
-              <a:rPr lang="en-US" dirty="0" smtClean="0"/>
-              <a:t>sent;</a:t>
-            </a:r>
-          </a:p>
-          <a:p>
-            <a:r>
-              <a:rPr lang="en-US" dirty="0"/>
-              <a:t>The Topic, have multiple subscribers and there is a chance that the topic does not know all the subscribers. The destination is unknown</a:t>
-            </a:r>
-            <a:r>
-              <a:rPr lang="en-US" dirty="0" smtClean="0"/>
-              <a:t>.</a:t>
-            </a:r>
-            <a:endParaRPr lang="en-US" dirty="0"/>
+              <a:t>")</a:t>
+            </a:r>
           </a:p>
           <a:p>
             <a:endParaRPr lang="en-US" dirty="0" smtClean="0"/>
@@ -7099,6 +7770,81 @@
     <p:extLst>
       <p:ext uri="{BB962C8B-B14F-4D97-AF65-F5344CB8AC3E}">
         <p14:creationId xmlns:p14="http://schemas.microsoft.com/office/powerpoint/2010/main" val="3790843648"/>
+      </p:ext>
+    </p:extLst>
+  </p:cSld>
+  <p:clrMapOvr>
+    <a:masterClrMapping/>
+  </p:clrMapOvr>
+</p:sld>
+</file>
+
+<file path=ppt/slides/slide9.xml><?xml version="1.0" encoding="utf-8"?>
+<p:sld xmlns:a="http://schemas.openxmlformats.org/drawingml/2006/main" xmlns:r="http://schemas.openxmlformats.org/officeDocument/2006/relationships" xmlns:p="http://schemas.openxmlformats.org/presentationml/2006/main">
+  <p:cSld>
+    <p:spTree>
+      <p:nvGrpSpPr>
+        <p:cNvPr id="1" name=""/>
+        <p:cNvGrpSpPr/>
+        <p:nvPr/>
+      </p:nvGrpSpPr>
+      <p:grpSpPr>
+        <a:xfrm>
+          <a:off x="0" y="0"/>
+          <a:ext cx="0" cy="0"/>
+          <a:chOff x="0" y="0"/>
+          <a:chExt cx="0" cy="0"/>
+        </a:xfrm>
+      </p:grpSpPr>
+      <p:sp>
+        <p:nvSpPr>
+          <p:cNvPr id="2" name="Title 1"/>
+          <p:cNvSpPr>
+            <a:spLocks noGrp="1"/>
+          </p:cNvSpPr>
+          <p:nvPr>
+            <p:ph type="title"/>
+          </p:nvPr>
+        </p:nvSpPr>
+        <p:spPr/>
+        <p:txBody>
+          <a:bodyPr/>
+          <a:lstStyle/>
+          <a:p>
+            <a:r>
+              <a:rPr lang="en-US" b="1" dirty="0"/>
+              <a:t>JMS Message Producers</a:t>
+            </a:r>
+            <a:br>
+              <a:rPr lang="en-US" b="1" dirty="0"/>
+            </a:br>
+            <a:endParaRPr lang="bg-BG" dirty="0"/>
+          </a:p>
+        </p:txBody>
+      </p:sp>
+      <p:sp>
+        <p:nvSpPr>
+          <p:cNvPr id="3" name="Content Placeholder 2"/>
+          <p:cNvSpPr>
+            <a:spLocks noGrp="1"/>
+          </p:cNvSpPr>
+          <p:nvPr>
+            <p:ph idx="1"/>
+          </p:nvPr>
+        </p:nvSpPr>
+        <p:spPr/>
+        <p:txBody>
+          <a:bodyPr/>
+          <a:lstStyle/>
+          <a:p>
+            <a:endParaRPr lang="bg-BG" dirty="0"/>
+          </a:p>
+        </p:txBody>
+      </p:sp>
+    </p:spTree>
+    <p:extLst>
+      <p:ext uri="{BB962C8B-B14F-4D97-AF65-F5344CB8AC3E}">
+        <p14:creationId xmlns:p14="http://schemas.microsoft.com/office/powerpoint/2010/main" val="3419103800"/>
       </p:ext>
     </p:extLst>
   </p:cSld>

</xml_diff>